<commit_message>
Clase 2 modulo 5 resuelta
</commit_message>
<xml_diff>
--- a/M5/Clase 01/Solución_punto_7_clase1_m5.pptx
+++ b/M5/Clase 01/Solución_punto_7_clase1_m5.pptx
@@ -5,10 +5,11 @@
     <p:sldMasterId id="2147483648" r:id="rId1"/>
   </p:sldMasterIdLst>
   <p:notesMasterIdLst>
-    <p:notesMasterId r:id="rId3"/>
+    <p:notesMasterId r:id="rId4"/>
   </p:notesMasterIdLst>
   <p:sldIdLst>
     <p:sldId id="256" r:id="rId2"/>
+    <p:sldId id="257" r:id="rId3"/>
   </p:sldIdLst>
   <p:sldSz cx="12192000" cy="6858000"/>
   <p:notesSz cx="6858000" cy="9144000"/>
@@ -107,6 +108,11 @@
       </a:defRPr>
     </a:lvl9pPr>
   </p:defaultTextStyle>
+  <p:extLst>
+    <p:ext uri="{EFAFB233-063F-42B5-8137-9DF3F51BA10A}">
+      <p15:sldGuideLst xmlns:p15="http://schemas.microsoft.com/office/powerpoint/2012/main"/>
+    </p:ext>
+  </p:extLst>
 </p:presentation>
 </file>
 
@@ -115,7 +121,7 @@
   <pc:docChgLst>
     <pc:chgData name="David Andrés Marimón Gil" userId="ecbca082c46736a1" providerId="LiveId" clId="{B374CC4C-3192-4443-9AD9-6B391C978D88}"/>
     <pc:docChg chg="undo custSel addSld modSld">
-      <pc:chgData name="David Andrés Marimón Gil" userId="ecbca082c46736a1" providerId="LiveId" clId="{B374CC4C-3192-4443-9AD9-6B391C978D88}" dt="2023-10-19T02:17:12.067" v="333" actId="1076"/>
+      <pc:chgData name="David Andrés Marimón Gil" userId="ecbca082c46736a1" providerId="LiveId" clId="{B374CC4C-3192-4443-9AD9-6B391C978D88}" dt="2023-10-20T00:03:24.575" v="471" actId="1076"/>
       <pc:docMkLst>
         <pc:docMk/>
       </pc:docMkLst>
@@ -325,6 +331,125 @@
             <ac:graphicFrameMk id="33" creationId="{2877E114-4A11-DEDD-157E-C3523C82A05D}"/>
           </ac:graphicFrameMkLst>
         </pc:graphicFrameChg>
+      </pc:sldChg>
+      <pc:sldChg chg="addSp delSp modSp new mod">
+        <pc:chgData name="David Andrés Marimón Gil" userId="ecbca082c46736a1" providerId="LiveId" clId="{B374CC4C-3192-4443-9AD9-6B391C978D88}" dt="2023-10-20T00:03:24.575" v="471" actId="1076"/>
+        <pc:sldMkLst>
+          <pc:docMk/>
+          <pc:sldMk cId="2989425543" sldId="257"/>
+        </pc:sldMkLst>
+        <pc:spChg chg="del">
+          <ac:chgData name="David Andrés Marimón Gil" userId="ecbca082c46736a1" providerId="LiveId" clId="{B374CC4C-3192-4443-9AD9-6B391C978D88}" dt="2023-10-19T23:32:38.083" v="335" actId="478"/>
+          <ac:spMkLst>
+            <pc:docMk/>
+            <pc:sldMk cId="2989425543" sldId="257"/>
+            <ac:spMk id="2" creationId="{03AE4A99-66A1-8A3E-992C-6AA368438846}"/>
+          </ac:spMkLst>
+        </pc:spChg>
+        <pc:spChg chg="del">
+          <ac:chgData name="David Andrés Marimón Gil" userId="ecbca082c46736a1" providerId="LiveId" clId="{B374CC4C-3192-4443-9AD9-6B391C978D88}" dt="2023-10-19T23:32:38.083" v="335" actId="478"/>
+          <ac:spMkLst>
+            <pc:docMk/>
+            <pc:sldMk cId="2989425543" sldId="257"/>
+            <ac:spMk id="3" creationId="{C1107999-E119-D204-6B39-A026CA0FCF62}"/>
+          </ac:spMkLst>
+        </pc:spChg>
+        <pc:spChg chg="add mod">
+          <ac:chgData name="David Andrés Marimón Gil" userId="ecbca082c46736a1" providerId="LiveId" clId="{B374CC4C-3192-4443-9AD9-6B391C978D88}" dt="2023-10-20T00:02:57.054" v="465" actId="1076"/>
+          <ac:spMkLst>
+            <pc:docMk/>
+            <pc:sldMk cId="2989425543" sldId="257"/>
+            <ac:spMk id="4" creationId="{C66625F0-37A0-AEC3-00AE-AEAB0199EC92}"/>
+          </ac:spMkLst>
+        </pc:spChg>
+        <pc:spChg chg="add del mod">
+          <ac:chgData name="David Andrés Marimón Gil" userId="ecbca082c46736a1" providerId="LiveId" clId="{B374CC4C-3192-4443-9AD9-6B391C978D88}" dt="2023-10-19T23:33:21.468" v="347" actId="478"/>
+          <ac:spMkLst>
+            <pc:docMk/>
+            <pc:sldMk cId="2989425543" sldId="257"/>
+            <ac:spMk id="5" creationId="{82478572-31D7-81E8-F220-07E473C0534A}"/>
+          </ac:spMkLst>
+        </pc:spChg>
+        <pc:spChg chg="add mod ord">
+          <ac:chgData name="David Andrés Marimón Gil" userId="ecbca082c46736a1" providerId="LiveId" clId="{B374CC4C-3192-4443-9AD9-6B391C978D88}" dt="2023-10-19T23:37:22.420" v="424" actId="164"/>
+          <ac:spMkLst>
+            <pc:docMk/>
+            <pc:sldMk cId="2989425543" sldId="257"/>
+            <ac:spMk id="6" creationId="{3DF52D65-77D3-A329-83AA-72C343F435EE}"/>
+          </ac:spMkLst>
+        </pc:spChg>
+        <pc:spChg chg="add mod ord">
+          <ac:chgData name="David Andrés Marimón Gil" userId="ecbca082c46736a1" providerId="LiveId" clId="{B374CC4C-3192-4443-9AD9-6B391C978D88}" dt="2023-10-19T23:37:22.420" v="424" actId="164"/>
+          <ac:spMkLst>
+            <pc:docMk/>
+            <pc:sldMk cId="2989425543" sldId="257"/>
+            <ac:spMk id="7" creationId="{945714F2-EBAB-F3C1-1D40-C69002B8563F}"/>
+          </ac:spMkLst>
+        </pc:spChg>
+        <pc:spChg chg="add mod ord">
+          <ac:chgData name="David Andrés Marimón Gil" userId="ecbca082c46736a1" providerId="LiveId" clId="{B374CC4C-3192-4443-9AD9-6B391C978D88}" dt="2023-10-19T23:37:22.420" v="424" actId="164"/>
+          <ac:spMkLst>
+            <pc:docMk/>
+            <pc:sldMk cId="2989425543" sldId="257"/>
+            <ac:spMk id="8" creationId="{13C8B954-7A7F-CFEC-C9D9-96E64E106A98}"/>
+          </ac:spMkLst>
+        </pc:spChg>
+        <pc:spChg chg="add del mod">
+          <ac:chgData name="David Andrés Marimón Gil" userId="ecbca082c46736a1" providerId="LiveId" clId="{B374CC4C-3192-4443-9AD9-6B391C978D88}" dt="2023-10-19T23:35:16.093" v="397" actId="478"/>
+          <ac:spMkLst>
+            <pc:docMk/>
+            <pc:sldMk cId="2989425543" sldId="257"/>
+            <ac:spMk id="9" creationId="{9164566E-E106-A97F-C2DF-FC17EB3B11AD}"/>
+          </ac:spMkLst>
+        </pc:spChg>
+        <pc:spChg chg="add mod">
+          <ac:chgData name="David Andrés Marimón Gil" userId="ecbca082c46736a1" providerId="LiveId" clId="{B374CC4C-3192-4443-9AD9-6B391C978D88}" dt="2023-10-19T23:37:26.261" v="425" actId="14100"/>
+          <ac:spMkLst>
+            <pc:docMk/>
+            <pc:sldMk cId="2989425543" sldId="257"/>
+            <ac:spMk id="10" creationId="{2A8912D4-AF41-F82A-87B1-6723C1092CDE}"/>
+          </ac:spMkLst>
+        </pc:spChg>
+        <pc:spChg chg="add del mod">
+          <ac:chgData name="David Andrés Marimón Gil" userId="ecbca082c46736a1" providerId="LiveId" clId="{B374CC4C-3192-4443-9AD9-6B391C978D88}" dt="2023-10-19T23:36:31.707" v="412"/>
+          <ac:spMkLst>
+            <pc:docMk/>
+            <pc:sldMk cId="2989425543" sldId="257"/>
+            <ac:spMk id="11" creationId="{1ABBFE6D-A112-1F4A-DD2D-6E7F4A9AA7AA}"/>
+          </ac:spMkLst>
+        </pc:spChg>
+        <pc:spChg chg="add mod">
+          <ac:chgData name="David Andrés Marimón Gil" userId="ecbca082c46736a1" providerId="LiveId" clId="{B374CC4C-3192-4443-9AD9-6B391C978D88}" dt="2023-10-19T23:37:22.420" v="424" actId="164"/>
+          <ac:spMkLst>
+            <pc:docMk/>
+            <pc:sldMk cId="2989425543" sldId="257"/>
+            <ac:spMk id="12" creationId="{605D58FA-F5E7-1F6C-6173-5038814B1F58}"/>
+          </ac:spMkLst>
+        </pc:spChg>
+        <pc:spChg chg="add mod">
+          <ac:chgData name="David Andrés Marimón Gil" userId="ecbca082c46736a1" providerId="LiveId" clId="{B374CC4C-3192-4443-9AD9-6B391C978D88}" dt="2023-10-20T00:02:06.516" v="463" actId="1076"/>
+          <ac:spMkLst>
+            <pc:docMk/>
+            <pc:sldMk cId="2989425543" sldId="257"/>
+            <ac:spMk id="14" creationId="{E9426397-0945-7E3F-71D2-423668901648}"/>
+          </ac:spMkLst>
+        </pc:spChg>
+        <pc:grpChg chg="add mod">
+          <ac:chgData name="David Andrés Marimón Gil" userId="ecbca082c46736a1" providerId="LiveId" clId="{B374CC4C-3192-4443-9AD9-6B391C978D88}" dt="2023-10-20T00:02:06.516" v="463" actId="1076"/>
+          <ac:grpSpMkLst>
+            <pc:docMk/>
+            <pc:sldMk cId="2989425543" sldId="257"/>
+            <ac:grpSpMk id="13" creationId="{D177316F-53D3-10A5-D85B-034C4836BC56}"/>
+          </ac:grpSpMkLst>
+        </pc:grpChg>
+        <pc:picChg chg="add mod">
+          <ac:chgData name="David Andrés Marimón Gil" userId="ecbca082c46736a1" providerId="LiveId" clId="{B374CC4C-3192-4443-9AD9-6B391C978D88}" dt="2023-10-20T00:03:24.575" v="471" actId="1076"/>
+          <ac:picMkLst>
+            <pc:docMk/>
+            <pc:sldMk cId="2989425543" sldId="257"/>
+            <ac:picMk id="16" creationId="{A7FB3814-0197-C85B-380A-DBCA6D3DE630}"/>
+          </ac:picMkLst>
+        </pc:picChg>
       </pc:sldChg>
     </pc:docChg>
   </pc:docChgLst>
@@ -4480,7 +4605,7 @@
           <a:p>
             <a:fld id="{99D42D6C-78F3-4DB6-A798-A2D0225CC3A3}" type="datetimeFigureOut">
               <a:rPr lang="es-CO" smtClean="0"/>
-              <a:t>18/10/2023</a:t>
+              <a:t>19/10/2023</a:t>
             </a:fld>
             <a:endParaRPr lang="es-CO"/>
           </a:p>
@@ -6178,6 +6303,467 @@
 </p:sld>
 </file>
 
+<file path=ppt/slides/slide2.xml><?xml version="1.0" encoding="utf-8"?>
+<p:sld xmlns:a="http://schemas.openxmlformats.org/drawingml/2006/main" xmlns:r="http://schemas.openxmlformats.org/officeDocument/2006/relationships" xmlns:p="http://schemas.openxmlformats.org/presentationml/2006/main">
+  <p:cSld>
+    <p:spTree>
+      <p:nvGrpSpPr>
+        <p:cNvPr id="1" name=""/>
+        <p:cNvGrpSpPr/>
+        <p:nvPr/>
+      </p:nvGrpSpPr>
+      <p:grpSpPr>
+        <a:xfrm>
+          <a:off x="0" y="0"/>
+          <a:ext cx="0" cy="0"/>
+          <a:chOff x="0" y="0"/>
+          <a:chExt cx="0" cy="0"/>
+        </a:xfrm>
+      </p:grpSpPr>
+      <p:sp>
+        <p:nvSpPr>
+          <p:cNvPr id="4" name="Rectángulo 3">
+            <a:extLst>
+              <a:ext uri="{FF2B5EF4-FFF2-40B4-BE49-F238E27FC236}">
+                <a16:creationId xmlns:a16="http://schemas.microsoft.com/office/drawing/2014/main" id="{C66625F0-37A0-AEC3-00AE-AEAB0199EC92}"/>
+              </a:ext>
+            </a:extLst>
+          </p:cNvPr>
+          <p:cNvSpPr/>
+          <p:nvPr/>
+        </p:nvSpPr>
+        <p:spPr>
+          <a:xfrm>
+            <a:off x="825624" y="358434"/>
+            <a:ext cx="2716567" cy="2372557"/>
+          </a:xfrm>
+          <a:prstGeom prst="rect">
+            <a:avLst/>
+          </a:prstGeom>
+          <a:solidFill>
+            <a:schemeClr val="bg2">
+              <a:lumMod val="90000"/>
+            </a:schemeClr>
+          </a:solidFill>
+          <a:ln>
+            <a:solidFill>
+              <a:schemeClr val="bg2">
+                <a:lumMod val="90000"/>
+              </a:schemeClr>
+            </a:solidFill>
+          </a:ln>
+        </p:spPr>
+        <p:style>
+          <a:lnRef idx="2">
+            <a:schemeClr val="accent1">
+              <a:shade val="15000"/>
+            </a:schemeClr>
+          </a:lnRef>
+          <a:fillRef idx="1">
+            <a:schemeClr val="accent1"/>
+          </a:fillRef>
+          <a:effectRef idx="0">
+            <a:schemeClr val="accent1"/>
+          </a:effectRef>
+          <a:fontRef idx="minor">
+            <a:schemeClr val="lt1"/>
+          </a:fontRef>
+        </p:style>
+        <p:txBody>
+          <a:bodyPr rtlCol="0" anchor="ctr"/>
+          <a:lstStyle/>
+          <a:p>
+            <a:pPr algn="ctr"/>
+            <a:endParaRPr lang="es-CO" dirty="0"/>
+          </a:p>
+        </p:txBody>
+      </p:sp>
+      <p:grpSp>
+        <p:nvGrpSpPr>
+          <p:cNvPr id="13" name="Grupo 12">
+            <a:extLst>
+              <a:ext uri="{FF2B5EF4-FFF2-40B4-BE49-F238E27FC236}">
+                <a16:creationId xmlns:a16="http://schemas.microsoft.com/office/drawing/2014/main" id="{D177316F-53D3-10A5-D85B-034C4836BC56}"/>
+              </a:ext>
+            </a:extLst>
+          </p:cNvPr>
+          <p:cNvGrpSpPr/>
+          <p:nvPr/>
+        </p:nvGrpSpPr>
+        <p:grpSpPr>
+          <a:xfrm>
+            <a:off x="1538797" y="497148"/>
+            <a:ext cx="1482571" cy="1655685"/>
+            <a:chOff x="1100831" y="1233995"/>
+            <a:chExt cx="1482571" cy="1655685"/>
+          </a:xfrm>
+        </p:grpSpPr>
+        <p:sp>
+          <p:nvSpPr>
+            <p:cNvPr id="8" name="Paralelogramo 7">
+              <a:extLst>
+                <a:ext uri="{FF2B5EF4-FFF2-40B4-BE49-F238E27FC236}">
+                  <a16:creationId xmlns:a16="http://schemas.microsoft.com/office/drawing/2014/main" id="{13C8B954-7A7F-CFEC-C9D9-96E64E106A98}"/>
+                </a:ext>
+              </a:extLst>
+            </p:cNvPr>
+            <p:cNvSpPr/>
+            <p:nvPr/>
+          </p:nvSpPr>
+          <p:spPr>
+            <a:xfrm>
+              <a:off x="1518083" y="1673440"/>
+              <a:ext cx="514904" cy="1216240"/>
+            </a:xfrm>
+            <a:prstGeom prst="parallelogram">
+              <a:avLst>
+                <a:gd name="adj" fmla="val 33621"/>
+              </a:avLst>
+            </a:prstGeom>
+            <a:solidFill>
+              <a:schemeClr val="tx1"/>
+            </a:solidFill>
+            <a:ln>
+              <a:solidFill>
+                <a:schemeClr val="bg1"/>
+              </a:solidFill>
+            </a:ln>
+          </p:spPr>
+          <p:style>
+            <a:lnRef idx="2">
+              <a:schemeClr val="accent1">
+                <a:shade val="15000"/>
+              </a:schemeClr>
+            </a:lnRef>
+            <a:fillRef idx="1">
+              <a:schemeClr val="accent1"/>
+            </a:fillRef>
+            <a:effectRef idx="0">
+              <a:schemeClr val="accent1"/>
+            </a:effectRef>
+            <a:fontRef idx="minor">
+              <a:schemeClr val="lt1"/>
+            </a:fontRef>
+          </p:style>
+          <p:txBody>
+            <a:bodyPr rtlCol="0" anchor="ctr"/>
+            <a:lstStyle/>
+            <a:p>
+              <a:pPr algn="ctr"/>
+              <a:endParaRPr lang="es-CO" dirty="0"/>
+            </a:p>
+          </p:txBody>
+        </p:sp>
+        <p:sp>
+          <p:nvSpPr>
+            <p:cNvPr id="10" name="Rectángulo 9">
+              <a:extLst>
+                <a:ext uri="{FF2B5EF4-FFF2-40B4-BE49-F238E27FC236}">
+                  <a16:creationId xmlns:a16="http://schemas.microsoft.com/office/drawing/2014/main" id="{2A8912D4-AF41-F82A-87B1-6723C1092CDE}"/>
+                </a:ext>
+              </a:extLst>
+            </p:cNvPr>
+            <p:cNvSpPr/>
+            <p:nvPr/>
+          </p:nvSpPr>
+          <p:spPr>
+            <a:xfrm>
+              <a:off x="1775535" y="1673440"/>
+              <a:ext cx="807867" cy="199746"/>
+            </a:xfrm>
+            <a:prstGeom prst="rect">
+              <a:avLst/>
+            </a:prstGeom>
+            <a:solidFill>
+              <a:schemeClr val="tx1"/>
+            </a:solidFill>
+            <a:ln>
+              <a:noFill/>
+            </a:ln>
+          </p:spPr>
+          <p:style>
+            <a:lnRef idx="2">
+              <a:schemeClr val="accent1">
+                <a:shade val="15000"/>
+              </a:schemeClr>
+            </a:lnRef>
+            <a:fillRef idx="1">
+              <a:schemeClr val="accent1"/>
+            </a:fillRef>
+            <a:effectRef idx="0">
+              <a:schemeClr val="accent1"/>
+            </a:effectRef>
+            <a:fontRef idx="minor">
+              <a:schemeClr val="lt1"/>
+            </a:fontRef>
+          </p:style>
+          <p:txBody>
+            <a:bodyPr rtlCol="0" anchor="ctr"/>
+            <a:lstStyle/>
+            <a:p>
+              <a:pPr algn="ctr"/>
+              <a:endParaRPr lang="es-CO" dirty="0"/>
+            </a:p>
+          </p:txBody>
+        </p:sp>
+        <p:sp>
+          <p:nvSpPr>
+            <p:cNvPr id="6" name="Paralelogramo 5">
+              <a:extLst>
+                <a:ext uri="{FF2B5EF4-FFF2-40B4-BE49-F238E27FC236}">
+                  <a16:creationId xmlns:a16="http://schemas.microsoft.com/office/drawing/2014/main" id="{3DF52D65-77D3-A329-83AA-72C343F435EE}"/>
+                </a:ext>
+              </a:extLst>
+            </p:cNvPr>
+            <p:cNvSpPr/>
+            <p:nvPr/>
+          </p:nvSpPr>
+          <p:spPr>
+            <a:xfrm>
+              <a:off x="1358283" y="1233995"/>
+              <a:ext cx="514904" cy="1447059"/>
+            </a:xfrm>
+            <a:prstGeom prst="parallelogram">
+              <a:avLst>
+                <a:gd name="adj" fmla="val 45690"/>
+              </a:avLst>
+            </a:prstGeom>
+            <a:solidFill>
+              <a:schemeClr val="tx1"/>
+            </a:solidFill>
+            <a:ln>
+              <a:solidFill>
+                <a:schemeClr val="bg1"/>
+              </a:solidFill>
+            </a:ln>
+          </p:spPr>
+          <p:style>
+            <a:lnRef idx="2">
+              <a:schemeClr val="accent1">
+                <a:shade val="15000"/>
+              </a:schemeClr>
+            </a:lnRef>
+            <a:fillRef idx="1">
+              <a:schemeClr val="accent1"/>
+            </a:fillRef>
+            <a:effectRef idx="0">
+              <a:schemeClr val="accent1"/>
+            </a:effectRef>
+            <a:fontRef idx="minor">
+              <a:schemeClr val="lt1"/>
+            </a:fontRef>
+          </p:style>
+          <p:txBody>
+            <a:bodyPr rtlCol="0" anchor="ctr"/>
+            <a:lstStyle/>
+            <a:p>
+              <a:pPr algn="ctr"/>
+              <a:endParaRPr lang="es-CO" dirty="0"/>
+            </a:p>
+          </p:txBody>
+        </p:sp>
+        <p:sp>
+          <p:nvSpPr>
+            <p:cNvPr id="7" name="Paralelogramo 6">
+              <a:extLst>
+                <a:ext uri="{FF2B5EF4-FFF2-40B4-BE49-F238E27FC236}">
+                  <a16:creationId xmlns:a16="http://schemas.microsoft.com/office/drawing/2014/main" id="{945714F2-EBAB-F3C1-1D40-C69002B8563F}"/>
+                </a:ext>
+              </a:extLst>
+            </p:cNvPr>
+            <p:cNvSpPr/>
+            <p:nvPr/>
+          </p:nvSpPr>
+          <p:spPr>
+            <a:xfrm flipH="1">
+              <a:off x="1100831" y="1233996"/>
+              <a:ext cx="514904" cy="1447060"/>
+            </a:xfrm>
+            <a:prstGeom prst="parallelogram">
+              <a:avLst>
+                <a:gd name="adj" fmla="val 52586"/>
+              </a:avLst>
+            </a:prstGeom>
+            <a:solidFill>
+              <a:schemeClr val="tx1"/>
+            </a:solidFill>
+            <a:ln>
+              <a:solidFill>
+                <a:schemeClr val="bg1"/>
+              </a:solidFill>
+            </a:ln>
+          </p:spPr>
+          <p:style>
+            <a:lnRef idx="2">
+              <a:schemeClr val="accent1">
+                <a:shade val="15000"/>
+              </a:schemeClr>
+            </a:lnRef>
+            <a:fillRef idx="1">
+              <a:schemeClr val="accent1"/>
+            </a:fillRef>
+            <a:effectRef idx="0">
+              <a:schemeClr val="accent1"/>
+            </a:effectRef>
+            <a:fontRef idx="minor">
+              <a:schemeClr val="lt1"/>
+            </a:fontRef>
+          </p:style>
+          <p:txBody>
+            <a:bodyPr rtlCol="0" anchor="ctr"/>
+            <a:lstStyle/>
+            <a:p>
+              <a:pPr algn="ctr"/>
+              <a:endParaRPr lang="es-CO" dirty="0"/>
+            </a:p>
+          </p:txBody>
+        </p:sp>
+        <p:sp>
+          <p:nvSpPr>
+            <p:cNvPr id="12" name="Rectángulo 11">
+              <a:extLst>
+                <a:ext uri="{FF2B5EF4-FFF2-40B4-BE49-F238E27FC236}">
+                  <a16:creationId xmlns:a16="http://schemas.microsoft.com/office/drawing/2014/main" id="{605D58FA-F5E7-1F6C-6173-5038814B1F58}"/>
+                </a:ext>
+              </a:extLst>
+            </p:cNvPr>
+            <p:cNvSpPr/>
+            <p:nvPr/>
+          </p:nvSpPr>
+          <p:spPr>
+            <a:xfrm>
+              <a:off x="1929408" y="2081812"/>
+              <a:ext cx="591850" cy="199748"/>
+            </a:xfrm>
+            <a:prstGeom prst="rect">
+              <a:avLst/>
+            </a:prstGeom>
+            <a:solidFill>
+              <a:schemeClr val="tx1"/>
+            </a:solidFill>
+            <a:ln>
+              <a:noFill/>
+            </a:ln>
+          </p:spPr>
+          <p:style>
+            <a:lnRef idx="2">
+              <a:schemeClr val="accent1">
+                <a:shade val="15000"/>
+              </a:schemeClr>
+            </a:lnRef>
+            <a:fillRef idx="1">
+              <a:schemeClr val="accent1"/>
+            </a:fillRef>
+            <a:effectRef idx="0">
+              <a:schemeClr val="accent1"/>
+            </a:effectRef>
+            <a:fontRef idx="minor">
+              <a:schemeClr val="lt1"/>
+            </a:fontRef>
+          </p:style>
+          <p:txBody>
+            <a:bodyPr rtlCol="0" anchor="ctr"/>
+            <a:lstStyle/>
+            <a:p>
+              <a:pPr algn="ctr"/>
+              <a:endParaRPr lang="es-CO" dirty="0"/>
+            </a:p>
+          </p:txBody>
+        </p:sp>
+      </p:grpSp>
+      <p:sp>
+        <p:nvSpPr>
+          <p:cNvPr id="14" name="CuadroTexto 13">
+            <a:extLst>
+              <a:ext uri="{FF2B5EF4-FFF2-40B4-BE49-F238E27FC236}">
+                <a16:creationId xmlns:a16="http://schemas.microsoft.com/office/drawing/2014/main" id="{E9426397-0945-7E3F-71D2-423668901648}"/>
+              </a:ext>
+            </a:extLst>
+          </p:cNvPr>
+          <p:cNvSpPr txBox="1"/>
+          <p:nvPr/>
+        </p:nvSpPr>
+        <p:spPr>
+          <a:xfrm>
+            <a:off x="1538797" y="2281305"/>
+            <a:ext cx="1083075" cy="369332"/>
+          </a:xfrm>
+          <a:prstGeom prst="rect">
+            <a:avLst/>
+          </a:prstGeom>
+          <a:noFill/>
+        </p:spPr>
+        <p:txBody>
+          <a:bodyPr wrap="square" rtlCol="0">
+            <a:spAutoFit/>
+          </a:bodyPr>
+          <a:lstStyle/>
+          <a:p>
+            <a:r>
+              <a:rPr lang="es-CO" dirty="0" err="1">
+                <a:latin typeface="DejaVu Sans" panose="020B0603030804020204" pitchFamily="34" charset="0"/>
+                <a:ea typeface="DejaVu Sans" panose="020B0603030804020204" pitchFamily="34" charset="0"/>
+                <a:cs typeface="DejaVu Sans" panose="020B0603030804020204" pitchFamily="34" charset="0"/>
+              </a:rPr>
+              <a:t>VonFine</a:t>
+            </a:r>
+            <a:endParaRPr lang="es-CO" dirty="0">
+              <a:latin typeface="DejaVu Sans" panose="020B0603030804020204" pitchFamily="34" charset="0"/>
+              <a:ea typeface="DejaVu Sans" panose="020B0603030804020204" pitchFamily="34" charset="0"/>
+              <a:cs typeface="DejaVu Sans" panose="020B0603030804020204" pitchFamily="34" charset="0"/>
+            </a:endParaRPr>
+          </a:p>
+        </p:txBody>
+      </p:sp>
+      <p:pic>
+        <p:nvPicPr>
+          <p:cNvPr id="16" name="Imagen 15">
+            <a:extLst>
+              <a:ext uri="{FF2B5EF4-FFF2-40B4-BE49-F238E27FC236}">
+                <a16:creationId xmlns:a16="http://schemas.microsoft.com/office/drawing/2014/main" id="{A7FB3814-0197-C85B-380A-DBCA6D3DE630}"/>
+              </a:ext>
+            </a:extLst>
+          </p:cNvPr>
+          <p:cNvPicPr>
+            <a:picLocks noChangeAspect="1"/>
+          </p:cNvPicPr>
+          <p:nvPr/>
+        </p:nvPicPr>
+        <p:blipFill>
+          <a:blip r:embed="rId2">
+            <a:extLst>
+              <a:ext uri="{28A0092B-C50C-407E-A947-70E740481C1C}">
+                <a14:useLocalDpi xmlns:a14="http://schemas.microsoft.com/office/drawing/2010/main" val="0"/>
+              </a:ext>
+            </a:extLst>
+          </a:blip>
+          <a:stretch>
+            <a:fillRect/>
+          </a:stretch>
+        </p:blipFill>
+        <p:spPr>
+          <a:xfrm>
+            <a:off x="3701991" y="358434"/>
+            <a:ext cx="2731245" cy="2389839"/>
+          </a:xfrm>
+          <a:prstGeom prst="rect">
+            <a:avLst/>
+          </a:prstGeom>
+        </p:spPr>
+      </p:pic>
+    </p:spTree>
+    <p:extLst>
+      <p:ext uri="{BB962C8B-B14F-4D97-AF65-F5344CB8AC3E}">
+        <p14:creationId xmlns:p14="http://schemas.microsoft.com/office/powerpoint/2010/main" val="2989425543"/>
+      </p:ext>
+    </p:extLst>
+  </p:cSld>
+  <p:clrMapOvr>
+    <a:masterClrMapping/>
+  </p:clrMapOvr>
+</p:sld>
+</file>
+
 <file path=ppt/theme/theme1.xml><?xml version="1.0" encoding="utf-8"?>
 <a:theme xmlns:a="http://schemas.openxmlformats.org/drawingml/2006/main" name="Tema de Office">
   <a:themeElements>

</xml_diff>